<commit_message>
Added error bars to prior in cross valdation, uniform covariance. Added readmes to each Bayesian technique
</commit_message>
<xml_diff>
--- a/presentations/prelimPresentation.pptx
+++ b/presentations/prelimPresentation.pptx
@@ -5,7 +5,7 @@
     <p:sldMasterId id="2147483648" r:id="rId1"/>
   </p:sldMasterIdLst>
   <p:notesMasterIdLst>
-    <p:notesMasterId r:id="rId8"/>
+    <p:notesMasterId r:id="rId9"/>
   </p:notesMasterIdLst>
   <p:sldIdLst>
     <p:sldId id="256" r:id="rId2"/>
@@ -13,7 +13,8 @@
     <p:sldId id="258" r:id="rId4"/>
     <p:sldId id="259" r:id="rId5"/>
     <p:sldId id="260" r:id="rId6"/>
-    <p:sldId id="261" r:id="rId7"/>
+    <p:sldId id="262" r:id="rId7"/>
+    <p:sldId id="261" r:id="rId8"/>
   </p:sldIdLst>
   <p:sldSz cx="12192000" cy="6858000"/>
   <p:notesSz cx="6858000" cy="9144000"/>
@@ -112,6 +113,11 @@
       </a:defRPr>
     </a:lvl9pPr>
   </p:defaultTextStyle>
+  <p:extLst>
+    <p:ext uri="{EFAFB233-063F-42B5-8137-9DF3F51BA10A}">
+      <p15:sldGuideLst xmlns:p15="http://schemas.microsoft.com/office/powerpoint/2012/main"/>
+    </p:ext>
+  </p:extLst>
 </p:presentation>
 </file>
 
@@ -197,7 +203,7 @@
           <a:p>
             <a:fld id="{D17E2657-F044-46C4-A217-62DBF34DC3C8}" type="datetimeFigureOut">
               <a:rPr lang="en-US" smtClean="0"/>
-              <a:t>7/30/2018</a:t>
+              <a:t>8/1/2018</a:t>
             </a:fld>
             <a:endParaRPr lang="en-US"/>
           </a:p>
@@ -596,7 +602,7 @@
           <a:p>
             <a:fld id="{63372D29-EE7B-462E-B477-2E415AA3A8DB}" type="datetime1">
               <a:rPr lang="en-US" smtClean="0"/>
-              <a:t>7/30/2018</a:t>
+              <a:t>8/1/2018</a:t>
             </a:fld>
             <a:endParaRPr lang="en-US"/>
           </a:p>
@@ -770,7 +776,7 @@
           <a:p>
             <a:fld id="{AFEBBE4B-9133-45F1-9569-61417D279CBE}" type="datetime1">
               <a:rPr lang="en-US" smtClean="0"/>
-              <a:t>7/30/2018</a:t>
+              <a:t>8/1/2018</a:t>
             </a:fld>
             <a:endParaRPr lang="en-US"/>
           </a:p>
@@ -954,7 +960,7 @@
           <a:p>
             <a:fld id="{B20611FA-374A-4700-A7A3-4EF8CF33233B}" type="datetime1">
               <a:rPr lang="en-US" smtClean="0"/>
-              <a:t>7/30/2018</a:t>
+              <a:t>8/1/2018</a:t>
             </a:fld>
             <a:endParaRPr lang="en-US"/>
           </a:p>
@@ -1128,7 +1134,7 @@
           <a:p>
             <a:fld id="{21889516-5520-48B9-A897-8AF241B129FF}" type="datetime1">
               <a:rPr lang="en-US" smtClean="0"/>
-              <a:t>7/30/2018</a:t>
+              <a:t>8/1/2018</a:t>
             </a:fld>
             <a:endParaRPr lang="en-US"/>
           </a:p>
@@ -1378,7 +1384,7 @@
           <a:p>
             <a:fld id="{BA08ACD4-47A4-482D-BF43-B343387F982F}" type="datetime1">
               <a:rPr lang="en-US" smtClean="0"/>
-              <a:t>7/30/2018</a:t>
+              <a:t>8/1/2018</a:t>
             </a:fld>
             <a:endParaRPr lang="en-US"/>
           </a:p>
@@ -1614,7 +1620,7 @@
           <a:p>
             <a:fld id="{C7D653DF-0113-4D67-A5EF-906A135B5344}" type="datetime1">
               <a:rPr lang="en-US" smtClean="0"/>
-              <a:t>7/30/2018</a:t>
+              <a:t>8/1/2018</a:t>
             </a:fld>
             <a:endParaRPr lang="en-US"/>
           </a:p>
@@ -1985,7 +1991,7 @@
           <a:p>
             <a:fld id="{E527DF4B-54F7-4602-AAEC-F1C7CAD168F1}" type="datetime1">
               <a:rPr lang="en-US" smtClean="0"/>
-              <a:t>7/30/2018</a:t>
+              <a:t>8/1/2018</a:t>
             </a:fld>
             <a:endParaRPr lang="en-US"/>
           </a:p>
@@ -2107,7 +2113,7 @@
           <a:p>
             <a:fld id="{E5458198-CA64-42DF-A87D-7EE54DC8F11B}" type="datetime1">
               <a:rPr lang="en-US" smtClean="0"/>
-              <a:t>7/30/2018</a:t>
+              <a:t>8/1/2018</a:t>
             </a:fld>
             <a:endParaRPr lang="en-US"/>
           </a:p>
@@ -2206,7 +2212,7 @@
           <a:p>
             <a:fld id="{04DF3F9D-8262-42CE-9B9F-AB6029B91A96}" type="datetime1">
               <a:rPr lang="en-US" smtClean="0"/>
-              <a:t>7/30/2018</a:t>
+              <a:t>8/1/2018</a:t>
             </a:fld>
             <a:endParaRPr lang="en-US"/>
           </a:p>
@@ -2487,7 +2493,7 @@
           <a:p>
             <a:fld id="{91B0A890-0019-48F4-B997-6A067C6A7C9B}" type="datetime1">
               <a:rPr lang="en-US" smtClean="0"/>
-              <a:t>7/30/2018</a:t>
+              <a:t>8/1/2018</a:t>
             </a:fld>
             <a:endParaRPr lang="en-US"/>
           </a:p>
@@ -2744,7 +2750,7 @@
           <a:p>
             <a:fld id="{8D188C3E-24E3-4DD7-8139-088A46F4F86A}" type="datetime1">
               <a:rPr lang="en-US" smtClean="0"/>
-              <a:t>7/30/2018</a:t>
+              <a:t>8/1/2018</a:t>
             </a:fld>
             <a:endParaRPr lang="en-US"/>
           </a:p>
@@ -2961,7 +2967,7 @@
           <a:p>
             <a:fld id="{D2A3AA81-72B7-412C-A0F8-C0D733F7B3C6}" type="datetime1">
               <a:rPr lang="en-US" smtClean="0"/>
-              <a:t>7/30/2018</a:t>
+              <a:t>8/1/2018</a:t>
             </a:fld>
             <a:endParaRPr lang="en-US"/>
           </a:p>
@@ -3627,7 +3633,7 @@
         </p:blipFill>
         <p:spPr>
           <a:xfrm>
-            <a:off x="175646" y="3444688"/>
+            <a:off x="220149" y="2856583"/>
             <a:ext cx="3368561" cy="2529399"/>
           </a:xfrm>
         </p:spPr>
@@ -3654,7 +3660,7 @@
         </p:blipFill>
         <p:spPr>
           <a:xfrm>
-            <a:off x="4404091" y="3379714"/>
+            <a:off x="4448594" y="2791609"/>
             <a:ext cx="3455091" cy="2594373"/>
           </a:xfrm>
           <a:prstGeom prst="rect">
@@ -3670,7 +3676,7 @@
         </p:nvSpPr>
         <p:spPr>
           <a:xfrm>
-            <a:off x="3544207" y="4249071"/>
+            <a:off x="3588710" y="3660966"/>
             <a:ext cx="635430" cy="461997"/>
           </a:xfrm>
           <a:prstGeom prst="rightArrow">
@@ -3710,7 +3716,7 @@
         </p:nvSpPr>
         <p:spPr>
           <a:xfrm>
-            <a:off x="7903685" y="4249071"/>
+            <a:off x="7948188" y="3660966"/>
             <a:ext cx="635430" cy="461997"/>
           </a:xfrm>
           <a:prstGeom prst="rightArrow">
@@ -3752,8 +3758,8 @@
             </p:nvSpPr>
             <p:spPr>
               <a:xfrm>
-                <a:off x="8841975" y="3952424"/>
-                <a:ext cx="2831031" cy="1055161"/>
+                <a:off x="8902520" y="3364319"/>
+                <a:ext cx="2876621" cy="2178160"/>
               </a:xfrm>
               <a:prstGeom prst="rect">
                 <a:avLst/>
@@ -3766,6 +3772,7 @@
               </a:bodyPr>
               <a:lstStyle/>
               <a:p>
+                <a:pPr/>
                 <a14:m>
                   <m:oMathPara xmlns:m="http://schemas.openxmlformats.org/officeDocument/2006/math">
                     <m:oMathParaPr>
@@ -4033,7 +4040,65 @@
                     </m:oMath>
                   </m:oMathPara>
                 </a14:m>
-                <a:endParaRPr lang="en-US" sz="2400" dirty="0"/>
+                <a:endParaRPr lang="en-NZ" sz="2400" b="0" i="1" dirty="0" smtClean="0">
+                  <a:latin typeface="Cambria Math" panose="02040503050406030204" pitchFamily="18" charset="0"/>
+                </a:endParaRPr>
+              </a:p>
+              <a:p>
+                <a:pPr/>
+                <a:endParaRPr lang="en-NZ" sz="2400" b="0" i="1" dirty="0" smtClean="0">
+                  <a:latin typeface="Cambria Math" panose="02040503050406030204" pitchFamily="18" charset="0"/>
+                </a:endParaRPr>
+              </a:p>
+              <a:p>
+                <a:pPr/>
+                <a14:m>
+                  <m:oMathPara xmlns:m="http://schemas.openxmlformats.org/officeDocument/2006/math">
+                    <m:oMathParaPr>
+                      <m:jc m:val="centerGroup"/>
+                    </m:oMathParaPr>
+                    <m:oMath xmlns:m="http://schemas.openxmlformats.org/officeDocument/2006/math">
+                      <m:r>
+                        <a:rPr lang="en-NZ" sz="2400" b="0" i="1" smtClean="0">
+                          <a:latin typeface="Cambria Math" panose="02040503050406030204" pitchFamily="18" charset="0"/>
+                        </a:rPr>
+                        <m:t>𝐵𝐹𝐹</m:t>
+                      </m:r>
+                      <m:r>
+                        <a:rPr lang="en-NZ" sz="2400" b="0" i="1" smtClean="0">
+                          <a:latin typeface="Cambria Math" panose="02040503050406030204" pitchFamily="18" charset="0"/>
+                        </a:rPr>
+                        <m:t>=</m:t>
+                      </m:r>
+                      <m:f>
+                        <m:fPr>
+                          <m:ctrlPr>
+                            <a:rPr lang="en-NZ" sz="2400" b="0" i="1" smtClean="0">
+                              <a:latin typeface="Cambria Math" panose="02040503050406030204" pitchFamily="18" charset="0"/>
+                            </a:rPr>
+                          </m:ctrlPr>
+                        </m:fPr>
+                        <m:num>
+                          <m:r>
+                            <a:rPr lang="en-NZ" sz="2400" b="0" i="1" smtClean="0">
+                              <a:latin typeface="Cambria Math" panose="02040503050406030204" pitchFamily="18" charset="0"/>
+                            </a:rPr>
+                            <m:t>𝐵𝐹𝑉</m:t>
+                          </m:r>
+                        </m:num>
+                        <m:den>
+                          <m:r>
+                            <a:rPr lang="en-NZ" sz="2400" b="0" i="1" smtClean="0">
+                              <a:latin typeface="Cambria Math" panose="02040503050406030204" pitchFamily="18" charset="0"/>
+                            </a:rPr>
+                            <m:t>𝜙</m:t>
+                          </m:r>
+                        </m:den>
+                      </m:f>
+                    </m:oMath>
+                  </m:oMathPara>
+                </a14:m>
+                <a:endParaRPr lang="en-NZ" sz="2400" dirty="0"/>
               </a:p>
             </p:txBody>
           </p:sp>
@@ -4049,8 +4114,8 @@
             </p:nvSpPr>
             <p:spPr>
               <a:xfrm>
-                <a:off x="8841975" y="3952424"/>
-                <a:ext cx="2831031" cy="1055161"/>
+                <a:off x="8902520" y="3364319"/>
+                <a:ext cx="2876621" cy="2178160"/>
               </a:xfrm>
               <a:prstGeom prst="rect">
                 <a:avLst/>
@@ -4140,7 +4205,23 @@
                   </a:outerShdw>
                 </a:effectLst>
               </a:rPr>
-              <a:t>Nuclear Magnetic Resonance (NMR) measurements</a:t>
+              <a:t>Low Quality Nuclear </a:t>
+            </a:r>
+            <a:r>
+              <a:rPr lang="en-NZ" dirty="0" smtClean="0">
+                <a:ln w="0"/>
+                <a:solidFill>
+                  <a:schemeClr val="tx1"/>
+                </a:solidFill>
+                <a:effectLst>
+                  <a:outerShdw blurRad="38100" dist="19050" dir="2700000" algn="tl" rotWithShape="0">
+                    <a:schemeClr val="dk1">
+                      <a:alpha val="40000"/>
+                    </a:schemeClr>
+                  </a:outerShdw>
+                </a:effectLst>
+              </a:rPr>
+              <a:t>Magnetic Resonance (NMR) measurements</a:t>
             </a:r>
             <a:endParaRPr lang="en-US" dirty="0">
               <a:ln w="0"/>
@@ -4221,7 +4302,23 @@
                   </a:outerShdw>
                 </a:effectLst>
               </a:rPr>
-              <a:t>Distribution of fluid’s NMR relaxation</a:t>
+              <a:t>Distribution of fluid’s NMR </a:t>
+            </a:r>
+            <a:r>
+              <a:rPr lang="en-NZ" dirty="0" smtClean="0">
+                <a:ln w="0"/>
+                <a:solidFill>
+                  <a:schemeClr val="tx1"/>
+                </a:solidFill>
+                <a:effectLst>
+                  <a:outerShdw blurRad="38100" dist="19050" dir="2700000" algn="tl" rotWithShape="0">
+                    <a:schemeClr val="dk1">
+                      <a:alpha val="40000"/>
+                    </a:schemeClr>
+                  </a:outerShdw>
+                </a:effectLst>
+              </a:rPr>
+              <a:t>(T2) relaxation</a:t>
             </a:r>
             <a:endParaRPr lang="en-US" dirty="0">
               <a:ln w="0"/>
@@ -4446,6 +4543,227 @@
           </a:p>
         </p:txBody>
       </p:sp>
+      <p:sp>
+        <p:nvSpPr>
+          <p:cNvPr id="3" name="TextBox 2"/>
+          <p:cNvSpPr txBox="1"/>
+          <p:nvPr/>
+        </p:nvSpPr>
+        <p:spPr>
+          <a:xfrm>
+            <a:off x="947284" y="5686707"/>
+            <a:ext cx="1181862" cy="707886"/>
+          </a:xfrm>
+          <a:prstGeom prst="rect">
+            <a:avLst/>
+          </a:prstGeom>
+          <a:noFill/>
+        </p:spPr>
+        <p:txBody>
+          <a:bodyPr wrap="none" rtlCol="0">
+            <a:spAutoFit/>
+          </a:bodyPr>
+          <a:lstStyle/>
+          <a:p>
+            <a:r>
+              <a:rPr lang="en-NZ" sz="4000" dirty="0" smtClean="0"/>
+              <a:t>Start</a:t>
+            </a:r>
+            <a:endParaRPr lang="en-US" sz="4000" dirty="0"/>
+          </a:p>
+        </p:txBody>
+      </p:sp>
+      <p:sp>
+        <p:nvSpPr>
+          <p:cNvPr id="16" name="TextBox 15"/>
+          <p:cNvSpPr txBox="1"/>
+          <p:nvPr/>
+        </p:nvSpPr>
+        <p:spPr>
+          <a:xfrm>
+            <a:off x="10482424" y="5671915"/>
+            <a:ext cx="1141659" cy="707886"/>
+          </a:xfrm>
+          <a:prstGeom prst="rect">
+            <a:avLst/>
+          </a:prstGeom>
+          <a:noFill/>
+        </p:spPr>
+        <p:txBody>
+          <a:bodyPr wrap="none" rtlCol="0">
+            <a:spAutoFit/>
+          </a:bodyPr>
+          <a:lstStyle/>
+          <a:p>
+            <a:r>
+              <a:rPr lang="en-NZ" sz="4000" dirty="0" smtClean="0"/>
+              <a:t>Goal</a:t>
+            </a:r>
+            <a:endParaRPr lang="en-US" sz="4000" dirty="0"/>
+          </a:p>
+        </p:txBody>
+      </p:sp>
+      <p:sp>
+        <p:nvSpPr>
+          <p:cNvPr id="20" name="Rounded Rectangle 19"/>
+          <p:cNvSpPr/>
+          <p:nvPr/>
+        </p:nvSpPr>
+        <p:spPr>
+          <a:xfrm>
+            <a:off x="3160294" y="5734440"/>
+            <a:ext cx="6240379" cy="612422"/>
+          </a:xfrm>
+          <a:prstGeom prst="roundRect">
+            <a:avLst/>
+          </a:prstGeom>
+          <a:solidFill>
+            <a:schemeClr val="accent1">
+              <a:lumMod val="20000"/>
+              <a:lumOff val="80000"/>
+            </a:schemeClr>
+          </a:solidFill>
+          <a:ln>
+            <a:solidFill>
+              <a:schemeClr val="accent1">
+                <a:lumMod val="50000"/>
+              </a:schemeClr>
+            </a:solidFill>
+          </a:ln>
+        </p:spPr>
+        <p:style>
+          <a:lnRef idx="2">
+            <a:schemeClr val="accent1">
+              <a:shade val="50000"/>
+            </a:schemeClr>
+          </a:lnRef>
+          <a:fillRef idx="1">
+            <a:schemeClr val="accent1"/>
+          </a:fillRef>
+          <a:effectRef idx="0">
+            <a:schemeClr val="accent1"/>
+          </a:effectRef>
+          <a:fontRef idx="minor">
+            <a:schemeClr val="lt1"/>
+          </a:fontRef>
+        </p:style>
+        <p:txBody>
+          <a:bodyPr rtlCol="0" anchor="ctr"/>
+          <a:lstStyle/>
+          <a:p>
+            <a:pPr algn="ctr"/>
+            <a:r>
+              <a:rPr lang="en-NZ" dirty="0" smtClean="0">
+                <a:ln w="0"/>
+                <a:solidFill>
+                  <a:schemeClr val="tx1"/>
+                </a:solidFill>
+                <a:effectLst>
+                  <a:outerShdw blurRad="38100" dist="19050" dir="2700000" algn="tl" rotWithShape="0">
+                    <a:schemeClr val="dk1">
+                      <a:alpha val="40000"/>
+                    </a:schemeClr>
+                  </a:outerShdw>
+                </a:effectLst>
+              </a:rPr>
+              <a:t>Estimator, the deliverable</a:t>
+            </a:r>
+            <a:endParaRPr lang="en-US" dirty="0">
+              <a:ln w="0"/>
+              <a:solidFill>
+                <a:schemeClr val="tx1"/>
+              </a:solidFill>
+              <a:effectLst>
+                <a:outerShdw blurRad="38100" dist="19050" dir="2700000" algn="tl" rotWithShape="0">
+                  <a:schemeClr val="dk1">
+                    <a:alpha val="40000"/>
+                  </a:schemeClr>
+                </a:outerShdw>
+              </a:effectLst>
+            </a:endParaRPr>
+          </a:p>
+        </p:txBody>
+      </p:sp>
+      <p:sp>
+        <p:nvSpPr>
+          <p:cNvPr id="25" name="Right Arrow 24"/>
+          <p:cNvSpPr/>
+          <p:nvPr/>
+        </p:nvSpPr>
+        <p:spPr>
+          <a:xfrm>
+            <a:off x="2261052" y="5809652"/>
+            <a:ext cx="635430" cy="461997"/>
+          </a:xfrm>
+          <a:prstGeom prst="rightArrow">
+            <a:avLst/>
+          </a:prstGeom>
+        </p:spPr>
+        <p:style>
+          <a:lnRef idx="2">
+            <a:schemeClr val="accent1">
+              <a:shade val="50000"/>
+            </a:schemeClr>
+          </a:lnRef>
+          <a:fillRef idx="1">
+            <a:schemeClr val="accent1"/>
+          </a:fillRef>
+          <a:effectRef idx="0">
+            <a:schemeClr val="accent1"/>
+          </a:effectRef>
+          <a:fontRef idx="minor">
+            <a:schemeClr val="lt1"/>
+          </a:fontRef>
+        </p:style>
+        <p:txBody>
+          <a:bodyPr rtlCol="0" anchor="ctr"/>
+          <a:lstStyle/>
+          <a:p>
+            <a:pPr algn="ctr"/>
+            <a:endParaRPr lang="en-US"/>
+          </a:p>
+        </p:txBody>
+      </p:sp>
+      <p:sp>
+        <p:nvSpPr>
+          <p:cNvPr id="26" name="Right Arrow 25"/>
+          <p:cNvSpPr/>
+          <p:nvPr/>
+        </p:nvSpPr>
+        <p:spPr>
+          <a:xfrm>
+            <a:off x="9717292" y="5845305"/>
+            <a:ext cx="635430" cy="461997"/>
+          </a:xfrm>
+          <a:prstGeom prst="rightArrow">
+            <a:avLst/>
+          </a:prstGeom>
+        </p:spPr>
+        <p:style>
+          <a:lnRef idx="2">
+            <a:schemeClr val="accent1">
+              <a:shade val="50000"/>
+            </a:schemeClr>
+          </a:lnRef>
+          <a:fillRef idx="1">
+            <a:schemeClr val="accent1"/>
+          </a:fillRef>
+          <a:effectRef idx="0">
+            <a:schemeClr val="accent1"/>
+          </a:effectRef>
+          <a:fontRef idx="minor">
+            <a:schemeClr val="lt1"/>
+          </a:fontRef>
+        </p:style>
+        <p:txBody>
+          <a:bodyPr rtlCol="0" anchor="ctr"/>
+          <a:lstStyle/>
+          <a:p>
+            <a:pPr algn="ctr"/>
+            <a:endParaRPr lang="en-US"/>
+          </a:p>
+        </p:txBody>
+      </p:sp>
     </p:spTree>
     <p:extLst>
       <p:ext uri="{BB962C8B-B14F-4D97-AF65-F5344CB8AC3E}">
@@ -4500,7 +4818,7 @@
           <a:p>
             <a:r>
               <a:rPr lang="en-NZ" dirty="0" smtClean="0"/>
-              <a:t>Background</a:t>
+              <a:t>Past Techniques</a:t>
             </a:r>
             <a:endParaRPr lang="en-US" dirty="0"/>
           </a:p>
@@ -4574,39 +4892,74 @@
                       </a:rPr>
                       <m:t>𝑓</m:t>
                     </m:r>
-                    <m:r>
-                      <a:rPr lang="en-NZ" i="1">
-                        <a:latin typeface="Cambria Math" panose="02040503050406030204" pitchFamily="18" charset="0"/>
-                      </a:rPr>
-                      <m:t>(</m:t>
-                    </m:r>
-                    <m:sSub>
-                      <m:sSubPr>
+                    <m:d>
+                      <m:dPr>
                         <m:ctrlPr>
                           <a:rPr lang="en-NZ" i="1">
                             <a:latin typeface="Cambria Math" panose="02040503050406030204" pitchFamily="18" charset="0"/>
                           </a:rPr>
                         </m:ctrlPr>
-                      </m:sSubPr>
+                      </m:dPr>
                       <m:e>
-                        <m:r>
-                          <a:rPr lang="en-NZ" i="1">
-                            <a:latin typeface="Cambria Math" panose="02040503050406030204" pitchFamily="18" charset="0"/>
-                          </a:rPr>
-                          <m:t>𝑇</m:t>
-                        </m:r>
+                        <m:sSub>
+                          <m:sSubPr>
+                            <m:ctrlPr>
+                              <a:rPr lang="en-NZ" i="1">
+                                <a:latin typeface="Cambria Math" panose="02040503050406030204" pitchFamily="18" charset="0"/>
+                              </a:rPr>
+                            </m:ctrlPr>
+                          </m:sSubPr>
+                          <m:e>
+                            <m:r>
+                              <a:rPr lang="en-NZ" i="1">
+                                <a:latin typeface="Cambria Math" panose="02040503050406030204" pitchFamily="18" charset="0"/>
+                              </a:rPr>
+                              <m:t>𝑇</m:t>
+                            </m:r>
+                          </m:e>
+                          <m:sub>
+                            <m:r>
+                              <a:rPr lang="en-NZ" i="1">
+                                <a:latin typeface="Cambria Math" panose="02040503050406030204" pitchFamily="18" charset="0"/>
+                              </a:rPr>
+                              <m:t>2</m:t>
+                            </m:r>
+                          </m:sub>
+                        </m:sSub>
                       </m:e>
-                      <m:sub>
-                        <m:r>
-                          <a:rPr lang="en-NZ" i="1">
-                            <a:latin typeface="Cambria Math" panose="02040503050406030204" pitchFamily="18" charset="0"/>
-                          </a:rPr>
-                          <m:t>2</m:t>
-                        </m:r>
-                      </m:sub>
-                    </m:sSub>
+                    </m:d>
+                  </m:oMath>
+                </a14:m>
+                <a:r>
+                  <a:rPr lang="en-NZ" dirty="0" smtClean="0"/>
+                  <a:t> </a:t>
+                </a:r>
+                <a:r>
+                  <a:rPr lang="en-NZ" dirty="0" smtClean="0"/>
+                  <a:t>from </a:t>
+                </a:r>
+                <a14:m>
+                  <m:oMath xmlns:m="http://schemas.openxmlformats.org/officeDocument/2006/math">
                     <m:r>
-                      <a:rPr lang="en-NZ" i="1">
+                      <a:rPr lang="en-NZ" b="0" i="1" smtClean="0">
+                        <a:latin typeface="Cambria Math" panose="02040503050406030204" pitchFamily="18" charset="0"/>
+                      </a:rPr>
+                      <m:t>𝑚</m:t>
+                    </m:r>
+                    <m:r>
+                      <a:rPr lang="en-NZ" b="0" i="1" smtClean="0">
+                        <a:latin typeface="Cambria Math" panose="02040503050406030204" pitchFamily="18" charset="0"/>
+                      </a:rPr>
+                      <m:t>(</m:t>
+                    </m:r>
+                    <m:r>
+                      <a:rPr lang="en-NZ" b="0" i="1" smtClean="0">
+                        <a:latin typeface="Cambria Math" panose="02040503050406030204" pitchFamily="18" charset="0"/>
+                      </a:rPr>
+                      <m:t>𝑡</m:t>
+                    </m:r>
+                    <m:r>
+                      <a:rPr lang="en-NZ" b="0" i="1" smtClean="0">
                         <a:latin typeface="Cambria Math" panose="02040503050406030204" pitchFamily="18" charset="0"/>
                       </a:rPr>
                       <m:t>)</m:t>
@@ -4615,7 +4968,11 @@
                 </a14:m>
                 <a:r>
                   <a:rPr lang="en-NZ" dirty="0" smtClean="0"/>
-                  <a:t> [4]</a:t>
+                  <a:t> </a:t>
+                </a:r>
+                <a:r>
+                  <a:rPr lang="en-NZ" dirty="0" smtClean="0"/>
+                  <a:t>[4]</a:t>
                 </a:r>
               </a:p>
               <a:p>
@@ -4632,37 +4989,83 @@
                       </a:rPr>
                       <m:t>𝑓</m:t>
                     </m:r>
+                    <m:d>
+                      <m:dPr>
+                        <m:ctrlPr>
+                          <a:rPr lang="en-NZ" i="1">
+                            <a:latin typeface="Cambria Math" panose="02040503050406030204" pitchFamily="18" charset="0"/>
+                          </a:rPr>
+                        </m:ctrlPr>
+                      </m:dPr>
+                      <m:e>
+                        <m:sSub>
+                          <m:sSubPr>
+                            <m:ctrlPr>
+                              <a:rPr lang="en-NZ" i="1">
+                                <a:latin typeface="Cambria Math" panose="02040503050406030204" pitchFamily="18" charset="0"/>
+                              </a:rPr>
+                            </m:ctrlPr>
+                          </m:sSubPr>
+                          <m:e>
+                            <m:r>
+                              <a:rPr lang="en-NZ" i="1">
+                                <a:latin typeface="Cambria Math" panose="02040503050406030204" pitchFamily="18" charset="0"/>
+                              </a:rPr>
+                              <m:t>𝑇</m:t>
+                            </m:r>
+                          </m:e>
+                          <m:sub>
+                            <m:r>
+                              <a:rPr lang="en-NZ" i="1">
+                                <a:latin typeface="Cambria Math" panose="02040503050406030204" pitchFamily="18" charset="0"/>
+                              </a:rPr>
+                              <m:t>2</m:t>
+                            </m:r>
+                          </m:sub>
+                        </m:sSub>
+                      </m:e>
+                    </m:d>
+                    <m:r>
+                      <m:rPr>
+                        <m:nor/>
+                      </m:rPr>
+                      <a:rPr lang="en-NZ" b="0" i="0" smtClean="0">
+                        <a:latin typeface="Cambria Math" panose="02040503050406030204" pitchFamily="18" charset="0"/>
+                      </a:rPr>
+                      <m:t> </m:t>
+                    </m:r>
+                    <m:r>
+                      <m:rPr>
+                        <m:nor/>
+                      </m:rPr>
+                      <a:rPr lang="en-NZ" dirty="0"/>
+                      <m:t>from</m:t>
+                    </m:r>
+                    <m:r>
+                      <m:rPr>
+                        <m:nor/>
+                      </m:rPr>
+                      <a:rPr lang="en-NZ" dirty="0"/>
+                      <m:t> </m:t>
+                    </m:r>
+                    <m:r>
+                      <a:rPr lang="en-NZ" i="1">
+                        <a:latin typeface="Cambria Math" panose="02040503050406030204" pitchFamily="18" charset="0"/>
+                      </a:rPr>
+                      <m:t>𝑚</m:t>
+                    </m:r>
                     <m:r>
                       <a:rPr lang="en-NZ" i="1">
                         <a:latin typeface="Cambria Math" panose="02040503050406030204" pitchFamily="18" charset="0"/>
                       </a:rPr>
                       <m:t>(</m:t>
                     </m:r>
-                    <m:sSub>
-                      <m:sSubPr>
-                        <m:ctrlPr>
-                          <a:rPr lang="en-NZ" i="1">
-                            <a:latin typeface="Cambria Math" panose="02040503050406030204" pitchFamily="18" charset="0"/>
-                          </a:rPr>
-                        </m:ctrlPr>
-                      </m:sSubPr>
-                      <m:e>
-                        <m:r>
-                          <a:rPr lang="en-NZ" i="1">
-                            <a:latin typeface="Cambria Math" panose="02040503050406030204" pitchFamily="18" charset="0"/>
-                          </a:rPr>
-                          <m:t>𝑇</m:t>
-                        </m:r>
-                      </m:e>
-                      <m:sub>
-                        <m:r>
-                          <a:rPr lang="en-NZ" i="1">
-                            <a:latin typeface="Cambria Math" panose="02040503050406030204" pitchFamily="18" charset="0"/>
-                          </a:rPr>
-                          <m:t>2</m:t>
-                        </m:r>
-                      </m:sub>
-                    </m:sSub>
+                    <m:r>
+                      <a:rPr lang="en-NZ" i="1">
+                        <a:latin typeface="Cambria Math" panose="02040503050406030204" pitchFamily="18" charset="0"/>
+                      </a:rPr>
+                      <m:t>𝑡</m:t>
+                    </m:r>
                     <m:r>
                       <a:rPr lang="en-NZ" i="1">
                         <a:latin typeface="Cambria Math" panose="02040503050406030204" pitchFamily="18" charset="0"/>
@@ -4673,7 +5076,7 @@
                 </a14:m>
                 <a:r>
                   <a:rPr lang="en-US" dirty="0" smtClean="0"/>
-                  <a:t> [5]</a:t>
+                  <a:t>[5]</a:t>
                 </a:r>
               </a:p>
               <a:p>
@@ -4706,7 +5109,7 @@
               <a:blipFill>
                 <a:blip r:embed="rId2"/>
                 <a:stretch>
-                  <a:fillRect l="-1871" t="-2322"/>
+                  <a:fillRect l="-1871" t="-2322" r="-208" b="-290"/>
                 </a:stretch>
               </a:blipFill>
             </p:spPr>
@@ -4793,7 +5196,7 @@
         </p:blipFill>
         <p:spPr>
           <a:xfrm>
-            <a:off x="6506361" y="1492704"/>
+            <a:off x="6725653" y="1739861"/>
             <a:ext cx="5333333" cy="4000000"/>
           </a:xfrm>
           <a:prstGeom prst="rect">
@@ -4809,8 +5212,8 @@
         </p:nvSpPr>
         <p:spPr>
           <a:xfrm>
-            <a:off x="7293094" y="5388734"/>
-            <a:ext cx="4546600" cy="369332"/>
+            <a:off x="7680158" y="5555195"/>
+            <a:ext cx="3424321" cy="369332"/>
           </a:xfrm>
           <a:prstGeom prst="rect">
             <a:avLst/>
@@ -4903,9 +5306,16 @@
                 <p:ph idx="1"/>
               </p:nvPr>
             </p:nvSpPr>
-            <p:spPr/>
+            <p:spPr>
+              <a:xfrm>
+                <a:off x="838200" y="1411705"/>
+                <a:ext cx="10515600" cy="4765258"/>
+              </a:xfrm>
+            </p:spPr>
             <p:txBody>
-              <a:bodyPr/>
+              <a:bodyPr>
+                <a:normAutofit/>
+              </a:bodyPr>
               <a:lstStyle/>
               <a:p>
                 <a:pPr marL="0" indent="0">
@@ -4926,14 +5336,19 @@
                 <a:pPr lvl="1"/>
                 <a:r>
                   <a:rPr lang="en-NZ" dirty="0" smtClean="0"/>
-                  <a:t>Measured performance</a:t>
+                  <a:t>Set up measurement system</a:t>
                 </a:r>
+                <a:endParaRPr lang="en-NZ" dirty="0" smtClean="0"/>
               </a:p>
               <a:p>
                 <a:pPr lvl="1"/>
                 <a:r>
                   <a:rPr lang="en-NZ" dirty="0" smtClean="0"/>
-                  <a:t>Main metric is Normalised </a:t>
+                  <a:t>main </a:t>
+                </a:r>
+                <a:r>
+                  <a:rPr lang="en-NZ" dirty="0" smtClean="0"/>
+                  <a:t>metric is Normalised </a:t>
                 </a:r>
                 <a:r>
                   <a:rPr lang="en-NZ" dirty="0"/>
@@ -4965,222 +5380,84 @@
                 </a:r>
                 <a:r>
                   <a:rPr lang="en-NZ" dirty="0" smtClean="0"/>
-                  <a:t>rror (NRMSE) [3]</a:t>
+                  <a:t>rror (NRMSE) [3</a:t>
                 </a:r>
+                <a:r>
+                  <a:rPr lang="en-NZ" dirty="0" smtClean="0"/>
+                  <a:t>]</a:t>
+                </a:r>
+              </a:p>
+              <a:p>
+                <a:pPr lvl="1"/>
+                <a:endParaRPr lang="en-NZ" dirty="0" smtClean="0"/>
+              </a:p>
+              <a:p>
+                <a:pPr>
+                  <a:buFont typeface="Wingdings" panose="05000000000000000000" pitchFamily="2" charset="2"/>
+                  <a:buChar char="à"/>
+                </a:pPr>
+                <a:r>
+                  <a:rPr lang="en-NZ" dirty="0" smtClean="0"/>
+                  <a:t>Implemented an initial Bayesian approach</a:t>
+                </a:r>
+                <a:r>
+                  <a:rPr lang="en-NZ" dirty="0" smtClean="0"/>
+                  <a:t> </a:t>
+                </a:r>
+                <a:endParaRPr lang="en-NZ" dirty="0" smtClean="0"/>
               </a:p>
               <a:p>
                 <a:pPr lvl="1"/>
                 <a14:m>
                   <m:oMath xmlns:m="http://schemas.openxmlformats.org/officeDocument/2006/math">
                     <m:r>
-                      <a:rPr lang="en-NZ" b="0" i="1" smtClean="0">
+                      <a:rPr lang="en-NZ" i="1" dirty="0" smtClean="0">
                         <a:latin typeface="Cambria Math" panose="02040503050406030204" pitchFamily="18" charset="0"/>
                       </a:rPr>
-                      <m:t>𝑁𝑅𝑀𝑆𝐸</m:t>
+                      <m:t>𝑚</m:t>
                     </m:r>
                     <m:r>
                       <a:rPr lang="en-NZ" b="0" i="1" smtClean="0">
                         <a:latin typeface="Cambria Math" panose="02040503050406030204" pitchFamily="18" charset="0"/>
                       </a:rPr>
-                      <m:t>=100 × </m:t>
+                      <m:t> </m:t>
                     </m:r>
-                    <m:f>
-                      <m:fPr>
-                        <m:ctrlPr>
-                          <a:rPr lang="en-NZ" b="0" i="1" smtClean="0">
-                            <a:latin typeface="Cambria Math" panose="02040503050406030204" pitchFamily="18" charset="0"/>
-                            <a:ea typeface="Cambria Math" panose="02040503050406030204" pitchFamily="18" charset="0"/>
-                          </a:rPr>
-                        </m:ctrlPr>
-                      </m:fPr>
-                      <m:num>
-                        <m:rad>
-                          <m:radPr>
-                            <m:degHide m:val="on"/>
-                            <m:ctrlPr>
-                              <a:rPr lang="en-NZ" b="0" i="1" smtClean="0">
-                                <a:latin typeface="Cambria Math" panose="02040503050406030204" pitchFamily="18" charset="0"/>
-                                <a:ea typeface="Cambria Math" panose="02040503050406030204" pitchFamily="18" charset="0"/>
-                              </a:rPr>
-                            </m:ctrlPr>
-                          </m:radPr>
-                          <m:deg/>
-                          <m:e>
-                            <m:sSup>
-                              <m:sSupPr>
-                                <m:ctrlPr>
-                                  <a:rPr lang="en-NZ" b="0" i="1" smtClean="0">
-                                    <a:latin typeface="Cambria Math" panose="02040503050406030204" pitchFamily="18" charset="0"/>
-                                    <a:ea typeface="Cambria Math" panose="02040503050406030204" pitchFamily="18" charset="0"/>
-                                  </a:rPr>
-                                </m:ctrlPr>
-                              </m:sSupPr>
-                              <m:e>
-                                <m:r>
-                                  <a:rPr lang="en-NZ" b="0" i="1" smtClean="0">
-                                    <a:latin typeface="Cambria Math" panose="02040503050406030204" pitchFamily="18" charset="0"/>
-                                    <a:ea typeface="Cambria Math" panose="02040503050406030204" pitchFamily="18" charset="0"/>
-                                  </a:rPr>
-                                  <m:t>(</m:t>
-                                </m:r>
-                                <m:sSub>
-                                  <m:sSubPr>
-                                    <m:ctrlPr>
-                                      <a:rPr lang="en-NZ" b="0" i="1" smtClean="0">
-                                        <a:latin typeface="Cambria Math" panose="02040503050406030204" pitchFamily="18" charset="0"/>
-                                        <a:ea typeface="Cambria Math" panose="02040503050406030204" pitchFamily="18" charset="0"/>
-                                      </a:rPr>
-                                    </m:ctrlPr>
-                                  </m:sSubPr>
-                                  <m:e>
-                                    <m:r>
-                                      <a:rPr lang="en-NZ" b="0" i="1" smtClean="0">
-                                        <a:latin typeface="Cambria Math" panose="02040503050406030204" pitchFamily="18" charset="0"/>
-                                        <a:ea typeface="Cambria Math" panose="02040503050406030204" pitchFamily="18" charset="0"/>
-                                      </a:rPr>
-                                      <m:t>𝜇</m:t>
-                                    </m:r>
-                                  </m:e>
-                                  <m:sub>
-                                    <m:r>
-                                      <m:rPr>
-                                        <m:sty m:val="p"/>
-                                      </m:rPr>
-                                      <a:rPr lang="en-NZ" b="0" i="0" smtClean="0">
-                                        <a:latin typeface="Cambria Math" panose="02040503050406030204" pitchFamily="18" charset="0"/>
-                                        <a:ea typeface="Cambria Math" panose="02040503050406030204" pitchFamily="18" charset="0"/>
-                                      </a:rPr>
-                                      <m:t>est</m:t>
-                                    </m:r>
-                                  </m:sub>
-                                </m:sSub>
-                                <m:r>
-                                  <a:rPr lang="en-NZ" b="0" i="1" smtClean="0">
-                                    <a:latin typeface="Cambria Math" panose="02040503050406030204" pitchFamily="18" charset="0"/>
-                                    <a:ea typeface="Cambria Math" panose="02040503050406030204" pitchFamily="18" charset="0"/>
-                                  </a:rPr>
-                                  <m:t> − </m:t>
-                                </m:r>
-                                <m:sSub>
-                                  <m:sSubPr>
-                                    <m:ctrlPr>
-                                      <a:rPr lang="en-NZ" b="0" i="1" smtClean="0">
-                                        <a:latin typeface="Cambria Math" panose="02040503050406030204" pitchFamily="18" charset="0"/>
-                                        <a:ea typeface="Cambria Math" panose="02040503050406030204" pitchFamily="18" charset="0"/>
-                                      </a:rPr>
-                                    </m:ctrlPr>
-                                  </m:sSubPr>
-                                  <m:e>
-                                    <m:r>
-                                      <a:rPr lang="en-NZ" b="0" i="1" smtClean="0">
-                                        <a:latin typeface="Cambria Math" panose="02040503050406030204" pitchFamily="18" charset="0"/>
-                                        <a:ea typeface="Cambria Math" panose="02040503050406030204" pitchFamily="18" charset="0"/>
-                                      </a:rPr>
-                                      <m:t>𝜇</m:t>
-                                    </m:r>
-                                  </m:e>
-                                  <m:sub>
-                                    <m:r>
-                                      <m:rPr>
-                                        <m:sty m:val="p"/>
-                                      </m:rPr>
-                                      <a:rPr lang="en-NZ" b="0" i="0" smtClean="0">
-                                        <a:latin typeface="Cambria Math" panose="02040503050406030204" pitchFamily="18" charset="0"/>
-                                        <a:ea typeface="Cambria Math" panose="02040503050406030204" pitchFamily="18" charset="0"/>
-                                      </a:rPr>
-                                      <m:t>true</m:t>
-                                    </m:r>
-                                  </m:sub>
-                                </m:sSub>
-                                <m:r>
-                                  <a:rPr lang="en-NZ" b="0" i="1" smtClean="0">
-                                    <a:latin typeface="Cambria Math" panose="02040503050406030204" pitchFamily="18" charset="0"/>
-                                    <a:ea typeface="Cambria Math" panose="02040503050406030204" pitchFamily="18" charset="0"/>
-                                  </a:rPr>
-                                  <m:t>)</m:t>
-                                </m:r>
-                              </m:e>
-                              <m:sup>
-                                <m:r>
-                                  <a:rPr lang="en-NZ" b="0" i="1" smtClean="0">
-                                    <a:latin typeface="Cambria Math" panose="02040503050406030204" pitchFamily="18" charset="0"/>
-                                    <a:ea typeface="Cambria Math" panose="02040503050406030204" pitchFamily="18" charset="0"/>
-                                  </a:rPr>
-                                  <m:t>2</m:t>
-                                </m:r>
-                              </m:sup>
-                            </m:sSup>
-                          </m:e>
-                        </m:rad>
-                      </m:num>
-                      <m:den>
-                        <m:sSub>
-                          <m:sSubPr>
-                            <m:ctrlPr>
-                              <a:rPr lang="en-NZ" b="0" i="1" smtClean="0">
-                                <a:latin typeface="Cambria Math" panose="02040503050406030204" pitchFamily="18" charset="0"/>
-                                <a:ea typeface="Cambria Math" panose="02040503050406030204" pitchFamily="18" charset="0"/>
-                              </a:rPr>
-                            </m:ctrlPr>
-                          </m:sSubPr>
-                          <m:e>
-                            <m:r>
-                              <a:rPr lang="en-NZ" b="0" i="1" smtClean="0">
-                                <a:latin typeface="Cambria Math" panose="02040503050406030204" pitchFamily="18" charset="0"/>
-                                <a:ea typeface="Cambria Math" panose="02040503050406030204" pitchFamily="18" charset="0"/>
-                              </a:rPr>
-                              <m:t>𝜇</m:t>
-                            </m:r>
-                          </m:e>
-                          <m:sub>
-                            <m:r>
-                              <m:rPr>
-                                <m:sty m:val="p"/>
-                              </m:rPr>
-                              <a:rPr lang="en-NZ" b="0" i="0" smtClean="0">
-                                <a:latin typeface="Cambria Math" panose="02040503050406030204" pitchFamily="18" charset="0"/>
-                                <a:ea typeface="Cambria Math" panose="02040503050406030204" pitchFamily="18" charset="0"/>
-                              </a:rPr>
-                              <m:t>true</m:t>
-                            </m:r>
-                          </m:sub>
-                        </m:sSub>
-                      </m:den>
-                    </m:f>
                   </m:oMath>
                 </a14:m>
                 <a:r>
                   <a:rPr lang="en-NZ" dirty="0" smtClean="0"/>
-                  <a:t> </a:t>
+                  <a:t>and </a:t>
                 </a:r>
-              </a:p>
-              <a:p>
-                <a:pPr marL="0" indent="0">
-                  <a:buNone/>
-                </a:pPr>
-                <a:endParaRPr lang="en-NZ" dirty="0" smtClean="0"/>
-              </a:p>
-              <a:p>
-                <a:pPr marL="0" indent="0">
-                  <a:buNone/>
-                </a:pPr>
-                <a:r>
-                  <a:rPr lang="en-NZ" dirty="0" smtClean="0">
-                    <a:sym typeface="Wingdings" panose="05000000000000000000" pitchFamily="2" charset="2"/>
-                  </a:rPr>
-                  <a:t> </a:t>
-                </a:r>
+                <a14:m>
+                  <m:oMath xmlns:m="http://schemas.openxmlformats.org/officeDocument/2006/math">
+                    <m:r>
+                      <a:rPr lang="en-NZ" b="0" i="1" smtClean="0">
+                        <a:latin typeface="Cambria Math" panose="02040503050406030204" pitchFamily="18" charset="0"/>
+                      </a:rPr>
+                      <m:t>𝑓</m:t>
+                    </m:r>
+                    <m:r>
+                      <a:rPr lang="en-NZ" b="0" i="1" smtClean="0">
+                        <a:latin typeface="Cambria Math" panose="02040503050406030204" pitchFamily="18" charset="0"/>
+                      </a:rPr>
+                      <m:t> </m:t>
+                    </m:r>
+                  </m:oMath>
+                </a14:m>
                 <a:r>
                   <a:rPr lang="en-NZ" dirty="0" smtClean="0"/>
-                  <a:t>Implemented a simplified Bayesian approach</a:t>
+                  <a:t>are vectors with each value being normally distributed</a:t>
                 </a:r>
+                <a:endParaRPr lang="en-NZ" b="0" i="1" dirty="0" smtClean="0">
+                  <a:latin typeface="Cambria Math" panose="02040503050406030204" pitchFamily="18" charset="0"/>
+                </a:endParaRPr>
               </a:p>
               <a:p>
                 <a:pPr lvl="1"/>
                 <a14:m>
                   <m:oMath xmlns:m="http://schemas.openxmlformats.org/officeDocument/2006/math">
                     <m:r>
-                      <a:rPr lang="en-NZ" b="0" i="1" smtClean="0">
+                      <a:rPr lang="en-NZ" i="1">
                         <a:latin typeface="Cambria Math" panose="02040503050406030204" pitchFamily="18" charset="0"/>
                       </a:rPr>
                       <m:t>𝑝</m:t>
@@ -5188,14 +5465,14 @@
                     <m:d>
                       <m:dPr>
                         <m:ctrlPr>
-                          <a:rPr lang="en-NZ" b="0" i="1" smtClean="0">
+                          <a:rPr lang="en-NZ" i="1">
                             <a:latin typeface="Cambria Math" panose="02040503050406030204" pitchFamily="18" charset="0"/>
                           </a:rPr>
                         </m:ctrlPr>
                       </m:dPr>
                       <m:e>
                         <m:r>
-                          <a:rPr lang="en-NZ" b="0" i="1" smtClean="0">
+                          <a:rPr lang="en-NZ" i="1">
                             <a:latin typeface="Cambria Math" panose="02040503050406030204" pitchFamily="18" charset="0"/>
                           </a:rPr>
                           <m:t>𝑓</m:t>
@@ -5203,7 +5480,7 @@
                       </m:e>
                       <m:e>
                         <m:r>
-                          <a:rPr lang="en-NZ" b="0" i="1" smtClean="0">
+                          <a:rPr lang="en-NZ" i="1">
                             <a:latin typeface="Cambria Math" panose="02040503050406030204" pitchFamily="18" charset="0"/>
                           </a:rPr>
                           <m:t>𝑚</m:t>
@@ -5211,7 +5488,7 @@
                       </m:e>
                     </m:d>
                     <m:r>
-                      <a:rPr lang="en-NZ" b="0" i="1" smtClean="0">
+                      <a:rPr lang="en-NZ" i="1">
                         <a:latin typeface="Cambria Math" panose="02040503050406030204" pitchFamily="18" charset="0"/>
                       </a:rPr>
                       <m:t>= </m:t>
@@ -5219,14 +5496,14 @@
                     <m:f>
                       <m:fPr>
                         <m:ctrlPr>
-                          <a:rPr lang="en-NZ" b="0" i="1" smtClean="0">
+                          <a:rPr lang="en-NZ" i="1">
                             <a:latin typeface="Cambria Math" panose="02040503050406030204" pitchFamily="18" charset="0"/>
                           </a:rPr>
                         </m:ctrlPr>
                       </m:fPr>
                       <m:num>
                         <m:r>
-                          <a:rPr lang="en-NZ" b="0" i="1" smtClean="0">
+                          <a:rPr lang="en-NZ" i="1">
                             <a:latin typeface="Cambria Math" panose="02040503050406030204" pitchFamily="18" charset="0"/>
                           </a:rPr>
                           <m:t>𝑝</m:t>
@@ -5234,14 +5511,14 @@
                         <m:d>
                           <m:dPr>
                             <m:ctrlPr>
-                              <a:rPr lang="en-NZ" b="0" i="1" smtClean="0">
+                              <a:rPr lang="en-NZ" i="1">
                                 <a:latin typeface="Cambria Math" panose="02040503050406030204" pitchFamily="18" charset="0"/>
                               </a:rPr>
                             </m:ctrlPr>
                           </m:dPr>
                           <m:e>
                             <m:r>
-                              <a:rPr lang="en-NZ" b="0" i="1" smtClean="0">
+                              <a:rPr lang="en-NZ" i="1">
                                 <a:latin typeface="Cambria Math" panose="02040503050406030204" pitchFamily="18" charset="0"/>
                               </a:rPr>
                               <m:t>𝑚</m:t>
@@ -5249,7 +5526,7 @@
                           </m:e>
                           <m:e>
                             <m:r>
-                              <a:rPr lang="en-NZ" b="0" i="1" smtClean="0">
+                              <a:rPr lang="en-NZ" i="1">
                                 <a:latin typeface="Cambria Math" panose="02040503050406030204" pitchFamily="18" charset="0"/>
                               </a:rPr>
                               <m:t>𝑓</m:t>
@@ -5257,25 +5534,25 @@
                           </m:e>
                         </m:d>
                         <m:r>
-                          <a:rPr lang="en-NZ" b="0" i="1" smtClean="0">
+                          <a:rPr lang="en-NZ" i="1">
                             <a:latin typeface="Cambria Math" panose="02040503050406030204" pitchFamily="18" charset="0"/>
                           </a:rPr>
                           <m:t>𝑝</m:t>
                         </m:r>
                         <m:r>
-                          <a:rPr lang="en-NZ" b="0" i="1" smtClean="0">
+                          <a:rPr lang="en-NZ" i="1">
                             <a:latin typeface="Cambria Math" panose="02040503050406030204" pitchFamily="18" charset="0"/>
                           </a:rPr>
                           <m:t>(</m:t>
                         </m:r>
                         <m:r>
-                          <a:rPr lang="en-NZ" b="0" i="1" smtClean="0">
+                          <a:rPr lang="en-NZ" i="1">
                             <a:latin typeface="Cambria Math" panose="02040503050406030204" pitchFamily="18" charset="0"/>
                           </a:rPr>
                           <m:t>𝑓</m:t>
                         </m:r>
                         <m:r>
-                          <a:rPr lang="en-NZ" b="0" i="1" smtClean="0">
+                          <a:rPr lang="en-NZ" i="1">
                             <a:latin typeface="Cambria Math" panose="02040503050406030204" pitchFamily="18" charset="0"/>
                           </a:rPr>
                           <m:t>)</m:t>
@@ -5283,25 +5560,25 @@
                       </m:num>
                       <m:den>
                         <m:r>
-                          <a:rPr lang="en-NZ" b="0" i="1" smtClean="0">
+                          <a:rPr lang="en-NZ" i="1">
                             <a:latin typeface="Cambria Math" panose="02040503050406030204" pitchFamily="18" charset="0"/>
                           </a:rPr>
                           <m:t>𝑝</m:t>
                         </m:r>
                         <m:r>
-                          <a:rPr lang="en-NZ" b="0" i="1" smtClean="0">
+                          <a:rPr lang="en-NZ" i="1">
                             <a:latin typeface="Cambria Math" panose="02040503050406030204" pitchFamily="18" charset="0"/>
                           </a:rPr>
                           <m:t>(</m:t>
                         </m:r>
                         <m:r>
-                          <a:rPr lang="en-NZ" b="0" i="1" smtClean="0">
+                          <a:rPr lang="en-NZ" i="1">
                             <a:latin typeface="Cambria Math" panose="02040503050406030204" pitchFamily="18" charset="0"/>
                           </a:rPr>
                           <m:t>𝑚</m:t>
                         </m:r>
                         <m:r>
-                          <a:rPr lang="en-NZ" b="0" i="1" smtClean="0">
+                          <a:rPr lang="en-NZ" i="1">
                             <a:latin typeface="Cambria Math" panose="02040503050406030204" pitchFamily="18" charset="0"/>
                           </a:rPr>
                           <m:t>)</m:t>
@@ -5312,7 +5589,7 @@
                       <m:rPr>
                         <m:nor/>
                       </m:rPr>
-                      <a:rPr lang="en-NZ" b="0" i="0" smtClean="0">
+                      <a:rPr lang="en-NZ">
                         <a:latin typeface="Cambria Math" panose="02040503050406030204" pitchFamily="18" charset="0"/>
                       </a:rPr>
                       <m:t>    </m:t>
@@ -5321,17 +5598,17 @@
                       <m:rPr>
                         <m:nor/>
                       </m:rPr>
-                      <a:rPr lang="en-US" smtClean="0"/>
+                      <a:rPr lang="en-US"/>
                       <m:t>∝</m:t>
                     </m:r>
                     <m:r>
-                      <a:rPr lang="en-NZ" b="0" i="1" smtClean="0">
+                      <a:rPr lang="en-NZ" i="1">
                         <a:latin typeface="Cambria Math" panose="02040503050406030204" pitchFamily="18" charset="0"/>
                       </a:rPr>
                       <m:t>     </m:t>
                     </m:r>
                     <m:r>
-                      <a:rPr lang="en-NZ" b="0" i="1" smtClean="0">
+                      <a:rPr lang="en-NZ" i="1">
                         <a:latin typeface="Cambria Math" panose="02040503050406030204" pitchFamily="18" charset="0"/>
                       </a:rPr>
                       <m:t>𝑝</m:t>
@@ -5339,14 +5616,14 @@
                     <m:d>
                       <m:dPr>
                         <m:ctrlPr>
-                          <a:rPr lang="en-NZ" b="0" i="1" smtClean="0">
+                          <a:rPr lang="en-NZ" i="1">
                             <a:latin typeface="Cambria Math" panose="02040503050406030204" pitchFamily="18" charset="0"/>
                           </a:rPr>
                         </m:ctrlPr>
                       </m:dPr>
                       <m:e>
                         <m:r>
-                          <a:rPr lang="en-NZ" b="0" i="1" smtClean="0">
+                          <a:rPr lang="en-NZ" i="1">
                             <a:latin typeface="Cambria Math" panose="02040503050406030204" pitchFamily="18" charset="0"/>
                           </a:rPr>
                           <m:t>𝑚</m:t>
@@ -5354,7 +5631,7 @@
                       </m:e>
                       <m:e>
                         <m:r>
-                          <a:rPr lang="en-NZ" b="0" i="1" smtClean="0">
+                          <a:rPr lang="en-NZ" i="1">
                             <a:latin typeface="Cambria Math" panose="02040503050406030204" pitchFamily="18" charset="0"/>
                           </a:rPr>
                           <m:t>𝑓</m:t>
@@ -5362,25 +5639,25 @@
                       </m:e>
                     </m:d>
                     <m:r>
-                      <a:rPr lang="en-NZ" b="0" i="1" smtClean="0">
+                      <a:rPr lang="en-NZ" i="1">
                         <a:latin typeface="Cambria Math" panose="02040503050406030204" pitchFamily="18" charset="0"/>
                       </a:rPr>
                       <m:t>𝑝</m:t>
                     </m:r>
                     <m:r>
-                      <a:rPr lang="en-NZ" b="0" i="1" smtClean="0">
+                      <a:rPr lang="en-NZ" i="1">
                         <a:latin typeface="Cambria Math" panose="02040503050406030204" pitchFamily="18" charset="0"/>
                       </a:rPr>
                       <m:t>(</m:t>
                     </m:r>
                     <m:r>
-                      <a:rPr lang="en-NZ" b="0" i="1" smtClean="0">
+                      <a:rPr lang="en-NZ" i="1">
                         <a:latin typeface="Cambria Math" panose="02040503050406030204" pitchFamily="18" charset="0"/>
                       </a:rPr>
                       <m:t>𝑓</m:t>
                     </m:r>
                     <m:r>
-                      <a:rPr lang="en-NZ" b="0" i="1" smtClean="0">
+                      <a:rPr lang="en-NZ" i="1">
                         <a:latin typeface="Cambria Math" panose="02040503050406030204" pitchFamily="18" charset="0"/>
                       </a:rPr>
                       <m:t>)</m:t>
@@ -5393,7 +5670,86 @@
                 <a:pPr lvl="1"/>
                 <a:r>
                   <a:rPr lang="en-NZ" dirty="0" smtClean="0"/>
-                  <a:t>Zero prior, alter variance to measure performance</a:t>
+                  <a:t>We have to find </a:t>
+                </a:r>
+                <a14:m>
+                  <m:oMath xmlns:m="http://schemas.openxmlformats.org/officeDocument/2006/math">
+                    <m:r>
+                      <a:rPr lang="en-NZ" i="1">
+                        <a:latin typeface="Cambria Math" panose="02040503050406030204" pitchFamily="18" charset="0"/>
+                      </a:rPr>
+                      <m:t>𝑝</m:t>
+                    </m:r>
+                    <m:r>
+                      <a:rPr lang="en-NZ" i="1">
+                        <a:latin typeface="Cambria Math" panose="02040503050406030204" pitchFamily="18" charset="0"/>
+                      </a:rPr>
+                      <m:t>(</m:t>
+                    </m:r>
+                    <m:r>
+                      <a:rPr lang="en-NZ" i="1">
+                        <a:latin typeface="Cambria Math" panose="02040503050406030204" pitchFamily="18" charset="0"/>
+                      </a:rPr>
+                      <m:t>𝑓</m:t>
+                    </m:r>
+                    <m:r>
+                      <a:rPr lang="en-NZ" i="1">
+                        <a:latin typeface="Cambria Math" panose="02040503050406030204" pitchFamily="18" charset="0"/>
+                      </a:rPr>
+                      <m:t>)</m:t>
+                    </m:r>
+                  </m:oMath>
+                </a14:m>
+                <a:r>
+                  <a:rPr lang="en-NZ" dirty="0" smtClean="0"/>
+                  <a:t>, the prior</a:t>
+                </a:r>
+              </a:p>
+              <a:p>
+                <a:pPr lvl="1"/>
+                <a:endParaRPr lang="en-NZ" dirty="0" smtClean="0"/>
+              </a:p>
+              <a:p>
+                <a:pPr marL="457200" lvl="1" indent="0">
+                  <a:buNone/>
+                </a:pPr>
+                <a:r>
+                  <a:rPr lang="en-NZ" b="1" dirty="0" smtClean="0"/>
+                  <a:t>First </a:t>
+                </a:r>
+                <a:r>
+                  <a:rPr lang="en-NZ" b="1" dirty="0" smtClean="0"/>
+                  <a:t>iteration: </a:t>
+                </a:r>
+                <a:r>
+                  <a:rPr lang="en-NZ" dirty="0" smtClean="0"/>
+                  <a:t>zero mean prior</a:t>
+                </a:r>
+                <a:r>
+                  <a:rPr lang="en-NZ" dirty="0" smtClean="0"/>
+                  <a:t>, alter </a:t>
+                </a:r>
+                <a:r>
+                  <a:rPr lang="en-NZ" dirty="0" smtClean="0"/>
+                  <a:t>variance of </a:t>
+                </a:r>
+                <a14:m>
+                  <m:oMath xmlns:m="http://schemas.openxmlformats.org/officeDocument/2006/math">
+                    <m:r>
+                      <a:rPr lang="en-NZ" i="1">
+                        <a:latin typeface="Cambria Math" panose="02040503050406030204" pitchFamily="18" charset="0"/>
+                      </a:rPr>
+                      <m:t>𝑓</m:t>
+                    </m:r>
+                  </m:oMath>
+                </a14:m>
+                <a:r>
+                  <a:rPr lang="en-NZ" dirty="0" smtClean="0"/>
+                  <a:t> to </a:t>
+                </a:r>
+                <a:r>
+                  <a:rPr lang="en-NZ" dirty="0" smtClean="0"/>
+                  <a:t>measure performance</a:t>
                 </a:r>
               </a:p>
             </p:txBody>
@@ -5411,10 +5767,14 @@
               </p:nvPr>
             </p:nvSpPr>
             <p:spPr>
+              <a:xfrm>
+                <a:off x="838200" y="1411705"/>
+                <a:ext cx="10515600" cy="4765258"/>
+              </a:xfrm>
               <a:blipFill>
                 <a:blip r:embed="rId2"/>
                 <a:stretch>
-                  <a:fillRect l="-1217" t="-2661"/>
+                  <a:fillRect l="-1217" t="-2561"/>
                 </a:stretch>
               </a:blipFill>
             </p:spPr>
@@ -5563,11 +5923,23 @@
                   <a:rPr lang="en-NZ" dirty="0" smtClean="0">
                     <a:sym typeface="Wingdings" panose="05000000000000000000" pitchFamily="2" charset="2"/>
                   </a:rPr>
-                  <a:t> </a:t>
+                  <a:t>1. </a:t>
                 </a:r>
                 <a:r>
                   <a:rPr lang="en-NZ" dirty="0" smtClean="0"/>
-                  <a:t>Construct more complex priors </a:t>
+                  <a:t>Construct </a:t>
+                </a:r>
+                <a:r>
+                  <a:rPr lang="en-NZ" dirty="0" smtClean="0"/>
+                  <a:t>a more </a:t>
+                </a:r>
+                <a:r>
+                  <a:rPr lang="en-NZ" dirty="0" smtClean="0"/>
+                  <a:t>complex </a:t>
+                </a:r>
+                <a:r>
+                  <a:rPr lang="en-NZ" dirty="0" smtClean="0"/>
+                  <a:t>prior </a:t>
                 </a:r>
                 <a14:m>
                   <m:oMath xmlns:m="http://schemas.openxmlformats.org/officeDocument/2006/math">
@@ -5608,7 +5980,15 @@
                 <a:pPr lvl="1"/>
                 <a:r>
                   <a:rPr lang="en-NZ" dirty="0" smtClean="0"/>
-                  <a:t>Combine with high quality measurements</a:t>
+                  <a:t>Combine with high </a:t>
+                </a:r>
+                <a:r>
+                  <a:rPr lang="en-NZ" dirty="0" smtClean="0"/>
+                  <a:t>quality laboratory </a:t>
+                </a:r>
+                <a:r>
+                  <a:rPr lang="en-NZ" dirty="0" smtClean="0"/>
+                  <a:t>measurements</a:t>
                 </a:r>
               </a:p>
               <a:p>
@@ -5630,18 +6010,35 @@
                   <a:rPr lang="en-NZ" dirty="0" smtClean="0">
                     <a:sym typeface="Wingdings" panose="05000000000000000000" pitchFamily="2" charset="2"/>
                   </a:rPr>
-                  <a:t> </a:t>
+                  <a:t>2. </a:t>
                 </a:r>
                 <a:r>
                   <a:rPr lang="en-NZ" dirty="0" smtClean="0"/>
-                  <a:t>Explore mixing the optimisation and Bayesian techniques</a:t>
+                  <a:t>Mix the </a:t>
+                </a:r>
+                <a:r>
+                  <a:rPr lang="en-NZ" dirty="0" smtClean="0"/>
+                  <a:t>optimisation and Bayesian techniques</a:t>
                 </a:r>
               </a:p>
               <a:p>
                 <a:pPr lvl="1"/>
                 <a:r>
                   <a:rPr lang="en-NZ" dirty="0" smtClean="0"/>
-                  <a:t>Add more constraints lab data</a:t>
+                  <a:t>Add another dimension of constraint</a:t>
+                </a:r>
+              </a:p>
+              <a:p>
+                <a:pPr lvl="1"/>
+                <a:endParaRPr lang="en-NZ" dirty="0"/>
+              </a:p>
+              <a:p>
+                <a:pPr marL="0" indent="0">
+                  <a:buNone/>
+                </a:pPr>
+                <a:r>
+                  <a:rPr lang="en-NZ" dirty="0" smtClean="0"/>
+                  <a:t>3. Cross validation experiments of all techniques</a:t>
                 </a:r>
                 <a:endParaRPr lang="en-US" dirty="0"/>
               </a:p>
@@ -5663,7 +6060,7 @@
               <a:blipFill>
                 <a:blip r:embed="rId2"/>
                 <a:stretch>
-                  <a:fillRect l="-1217" t="-2661"/>
+                  <a:fillRect l="-1217" t="-2241"/>
                 </a:stretch>
               </a:blipFill>
             </p:spPr>
@@ -5782,6 +6179,161 @@
           <a:p>
             <a:r>
               <a:rPr lang="en-NZ" dirty="0" smtClean="0"/>
+              <a:t>Conclusions</a:t>
+            </a:r>
+            <a:endParaRPr lang="en-US" dirty="0"/>
+          </a:p>
+        </p:txBody>
+      </p:sp>
+      <p:sp>
+        <p:nvSpPr>
+          <p:cNvPr id="3" name="Content Placeholder 2"/>
+          <p:cNvSpPr>
+            <a:spLocks noGrp="1"/>
+          </p:cNvSpPr>
+          <p:nvPr>
+            <p:ph idx="1"/>
+          </p:nvPr>
+        </p:nvSpPr>
+        <p:spPr/>
+        <p:txBody>
+          <a:bodyPr/>
+          <a:lstStyle/>
+          <a:p>
+            <a:pPr marL="514350" indent="-514350">
+              <a:buAutoNum type="arabicPeriod"/>
+            </a:pPr>
+            <a:r>
+              <a:rPr lang="en-NZ" dirty="0" smtClean="0"/>
+              <a:t>We want to find how much fluid is bound to a porous media in noisy environments</a:t>
+            </a:r>
+          </a:p>
+          <a:p>
+            <a:pPr marL="0" indent="0">
+              <a:buNone/>
+            </a:pPr>
+            <a:endParaRPr lang="en-NZ" dirty="0"/>
+          </a:p>
+          <a:p>
+            <a:pPr marL="0" indent="0">
+              <a:buNone/>
+            </a:pPr>
+            <a:r>
+              <a:rPr lang="en-NZ" dirty="0" smtClean="0"/>
+              <a:t>2.   Current techniques utilise optimisation based on the ILT</a:t>
+            </a:r>
+          </a:p>
+          <a:p>
+            <a:pPr marL="514350" indent="-514350">
+              <a:buAutoNum type="arabicPeriod"/>
+            </a:pPr>
+            <a:endParaRPr lang="en-NZ" dirty="0"/>
+          </a:p>
+          <a:p>
+            <a:pPr marL="0" indent="0">
+              <a:buNone/>
+            </a:pPr>
+            <a:r>
+              <a:rPr lang="en-NZ" dirty="0" smtClean="0"/>
+              <a:t>3.    The proposed technique is to use Bayesian statistics to combine with high quality laboratory data</a:t>
+            </a:r>
+            <a:endParaRPr lang="en-US" dirty="0"/>
+          </a:p>
+        </p:txBody>
+      </p:sp>
+      <p:sp>
+        <p:nvSpPr>
+          <p:cNvPr id="4" name="Footer Placeholder 3"/>
+          <p:cNvSpPr>
+            <a:spLocks noGrp="1"/>
+          </p:cNvSpPr>
+          <p:nvPr>
+            <p:ph type="ftr" sz="quarter" idx="11"/>
+          </p:nvPr>
+        </p:nvSpPr>
+        <p:spPr/>
+        <p:txBody>
+          <a:bodyPr/>
+          <a:lstStyle/>
+          <a:p>
+            <a:r>
+              <a:rPr lang="nb-NO" smtClean="0"/>
+              <a:t>David Dobbie - ENGR 489 2018</a:t>
+            </a:r>
+            <a:endParaRPr lang="en-US"/>
+          </a:p>
+        </p:txBody>
+      </p:sp>
+      <p:sp>
+        <p:nvSpPr>
+          <p:cNvPr id="5" name="Slide Number Placeholder 4"/>
+          <p:cNvSpPr>
+            <a:spLocks noGrp="1"/>
+          </p:cNvSpPr>
+          <p:nvPr>
+            <p:ph type="sldNum" sz="quarter" idx="12"/>
+          </p:nvPr>
+        </p:nvSpPr>
+        <p:spPr/>
+        <p:txBody>
+          <a:bodyPr/>
+          <a:lstStyle/>
+          <a:p>
+            <a:fld id="{8E74699A-6301-4C1B-BEA7-31B1EBC2027C}" type="slidenum">
+              <a:rPr lang="en-US" smtClean="0"/>
+              <a:t>6</a:t>
+            </a:fld>
+            <a:endParaRPr lang="en-US"/>
+          </a:p>
+        </p:txBody>
+      </p:sp>
+    </p:spTree>
+    <p:extLst>
+      <p:ext uri="{BB962C8B-B14F-4D97-AF65-F5344CB8AC3E}">
+        <p14:creationId xmlns:p14="http://schemas.microsoft.com/office/powerpoint/2010/main" val="1802109185"/>
+      </p:ext>
+    </p:extLst>
+  </p:cSld>
+  <p:clrMapOvr>
+    <a:masterClrMapping/>
+  </p:clrMapOvr>
+</p:sld>
+</file>
+
+<file path=ppt/slides/slide7.xml><?xml version="1.0" encoding="utf-8"?>
+<p:sld xmlns:a="http://schemas.openxmlformats.org/drawingml/2006/main" xmlns:r="http://schemas.openxmlformats.org/officeDocument/2006/relationships" xmlns:p="http://schemas.openxmlformats.org/presentationml/2006/main">
+  <p:cSld>
+    <p:spTree>
+      <p:nvGrpSpPr>
+        <p:cNvPr id="1" name=""/>
+        <p:cNvGrpSpPr/>
+        <p:nvPr/>
+      </p:nvGrpSpPr>
+      <p:grpSpPr>
+        <a:xfrm>
+          <a:off x="0" y="0"/>
+          <a:ext cx="0" cy="0"/>
+          <a:chOff x="0" y="0"/>
+          <a:chExt cx="0" cy="0"/>
+        </a:xfrm>
+      </p:grpSpPr>
+      <p:sp>
+        <p:nvSpPr>
+          <p:cNvPr id="2" name="Title 1"/>
+          <p:cNvSpPr>
+            <a:spLocks noGrp="1"/>
+          </p:cNvSpPr>
+          <p:nvPr>
+            <p:ph type="title"/>
+          </p:nvPr>
+        </p:nvSpPr>
+        <p:spPr/>
+        <p:txBody>
+          <a:bodyPr/>
+          <a:lstStyle/>
+          <a:p>
+            <a:r>
+              <a:rPr lang="en-NZ" dirty="0" smtClean="0"/>
               <a:t>References</a:t>
             </a:r>
             <a:endParaRPr lang="en-US" dirty="0"/>
@@ -6172,7 +6724,7 @@
           <a:p>
             <a:fld id="{8E74699A-6301-4C1B-BEA7-31B1EBC2027C}" type="slidenum">
               <a:rPr lang="en-US" smtClean="0"/>
-              <a:t>6</a:t>
+              <a:t>7</a:t>
             </a:fld>
             <a:endParaRPr lang="en-US"/>
           </a:p>

</xml_diff>